<commit_message>
added a few more
</commit_message>
<xml_diff>
--- a/Productivity Boosters for .NET Developers.pptx
+++ b/Productivity Boosters for .NET Developers.pptx
@@ -5,7 +5,7 @@
     <p:sldMasterId id="2147483840" r:id="rId1"/>
   </p:sldMasterIdLst>
   <p:notesMasterIdLst>
-    <p:notesMasterId r:id="rId11"/>
+    <p:notesMasterId r:id="rId13"/>
   </p:notesMasterIdLst>
   <p:sldIdLst>
     <p:sldId id="320" r:id="rId2"/>
@@ -15,8 +15,10 @@
     <p:sldId id="403" r:id="rId6"/>
     <p:sldId id="404" r:id="rId7"/>
     <p:sldId id="405" r:id="rId8"/>
-    <p:sldId id="406" r:id="rId9"/>
-    <p:sldId id="399" r:id="rId10"/>
+    <p:sldId id="407" r:id="rId9"/>
+    <p:sldId id="408" r:id="rId10"/>
+    <p:sldId id="406" r:id="rId11"/>
+    <p:sldId id="399" r:id="rId12"/>
   </p:sldIdLst>
   <p:sldSz cx="9144000" cy="6858000" type="screen4x3"/>
   <p:notesSz cx="6858000" cy="9144000"/>
@@ -3520,6 +3522,200 @@
 </p:sld>
 </file>
 
+<file path=ppt/slides/slide10.xml><?xml version="1.0" encoding="utf-8"?>
+<p:sld xmlns:a="http://schemas.openxmlformats.org/drawingml/2006/main" xmlns:r="http://schemas.openxmlformats.org/officeDocument/2006/relationships" xmlns:p="http://schemas.openxmlformats.org/presentationml/2006/main">
+  <p:cSld>
+    <p:spTree>
+      <p:nvGrpSpPr>
+        <p:cNvPr id="1" name=""/>
+        <p:cNvGrpSpPr/>
+        <p:nvPr/>
+      </p:nvGrpSpPr>
+      <p:grpSpPr>
+        <a:xfrm>
+          <a:off x="0" y="0"/>
+          <a:ext cx="0" cy="0"/>
+          <a:chOff x="0" y="0"/>
+          <a:chExt cx="0" cy="0"/>
+        </a:xfrm>
+      </p:grpSpPr>
+      <p:sp>
+        <p:nvSpPr>
+          <p:cNvPr id="4" name="Title 3"/>
+          <p:cNvSpPr>
+            <a:spLocks noGrp="1"/>
+          </p:cNvSpPr>
+          <p:nvPr>
+            <p:ph type="ctrTitle"/>
+          </p:nvPr>
+        </p:nvSpPr>
+        <p:spPr>
+          <a:xfrm>
+            <a:off x="304800" y="228600"/>
+            <a:ext cx="8534400" cy="6400800"/>
+          </a:xfrm>
+        </p:spPr>
+        <p:txBody>
+          <a:bodyPr anchor="ctr"/>
+          <a:lstStyle/>
+          <a:p>
+            <a:r>
+              <a:rPr lang="en-US" sz="9000" dirty="0" smtClean="0"/>
+              <a:t>Think long term!</a:t>
+            </a:r>
+            <a:endParaRPr lang="en-US" sz="9000" dirty="0"/>
+          </a:p>
+        </p:txBody>
+      </p:sp>
+    </p:spTree>
+  </p:cSld>
+  <p:clrMapOvr>
+    <a:masterClrMapping/>
+  </p:clrMapOvr>
+</p:sld>
+</file>
+
+<file path=ppt/slides/slide11.xml><?xml version="1.0" encoding="utf-8"?>
+<p:sld xmlns:a="http://schemas.openxmlformats.org/drawingml/2006/main" xmlns:r="http://schemas.openxmlformats.org/officeDocument/2006/relationships" xmlns:p="http://schemas.openxmlformats.org/presentationml/2006/main">
+  <p:cSld>
+    <p:spTree>
+      <p:nvGrpSpPr>
+        <p:cNvPr id="1" name=""/>
+        <p:cNvGrpSpPr/>
+        <p:nvPr/>
+      </p:nvGrpSpPr>
+      <p:grpSpPr>
+        <a:xfrm>
+          <a:off x="0" y="0"/>
+          <a:ext cx="0" cy="0"/>
+          <a:chOff x="0" y="0"/>
+          <a:chExt cx="0" cy="0"/>
+        </a:xfrm>
+      </p:grpSpPr>
+      <p:sp>
+        <p:nvSpPr>
+          <p:cNvPr id="2" name="Title 1"/>
+          <p:cNvSpPr>
+            <a:spLocks noGrp="1"/>
+          </p:cNvSpPr>
+          <p:nvPr>
+            <p:ph type="title"/>
+          </p:nvPr>
+        </p:nvSpPr>
+        <p:spPr/>
+        <p:txBody>
+          <a:bodyPr>
+            <a:normAutofit/>
+          </a:bodyPr>
+          <a:lstStyle/>
+          <a:p>
+            <a:r>
+              <a:rPr lang="en-US" dirty="0" smtClean="0"/>
+              <a:t>My Info</a:t>
+            </a:r>
+            <a:endParaRPr lang="en-US" dirty="0"/>
+          </a:p>
+        </p:txBody>
+      </p:sp>
+      <p:sp>
+        <p:nvSpPr>
+          <p:cNvPr id="3" name="Content Placeholder 2"/>
+          <p:cNvSpPr>
+            <a:spLocks noGrp="1"/>
+          </p:cNvSpPr>
+          <p:nvPr>
+            <p:ph idx="1"/>
+          </p:nvPr>
+        </p:nvSpPr>
+        <p:spPr/>
+        <p:txBody>
+          <a:bodyPr>
+            <a:normAutofit/>
+          </a:bodyPr>
+          <a:lstStyle/>
+          <a:p>
+            <a:r>
+              <a:rPr lang="en-US" dirty="0" smtClean="0"/>
+              <a:t>Email: </a:t>
+            </a:r>
+            <a:r>
+              <a:rPr lang="en-US" b="1" dirty="0" smtClean="0">
+                <a:hlinkClick r:id="rId2"/>
+              </a:rPr>
+              <a:t>jon@jonkruger.com</a:t>
+            </a:r>
+            <a:endParaRPr lang="en-US" b="1" dirty="0" smtClean="0"/>
+          </a:p>
+          <a:p>
+            <a:r>
+              <a:rPr lang="en-US" dirty="0" smtClean="0"/>
+              <a:t>Twitter: </a:t>
+            </a:r>
+            <a:r>
+              <a:rPr lang="en-US" b="1" dirty="0" smtClean="0"/>
+              <a:t>@</a:t>
+            </a:r>
+            <a:r>
+              <a:rPr lang="en-US" b="1" dirty="0" err="1" smtClean="0"/>
+              <a:t>JonKruger</a:t>
+            </a:r>
+            <a:endParaRPr lang="en-US" b="1" dirty="0" smtClean="0"/>
+          </a:p>
+          <a:p>
+            <a:r>
+              <a:rPr lang="en-US" dirty="0" smtClean="0"/>
+              <a:t>Blog: </a:t>
+            </a:r>
+            <a:r>
+              <a:rPr lang="en-US" b="1" dirty="0" smtClean="0">
+                <a:hlinkClick r:id="rId3"/>
+              </a:rPr>
+              <a:t>http://jonkruger.com/blog</a:t>
+            </a:r>
+            <a:endParaRPr lang="en-US" b="1" dirty="0" smtClean="0"/>
+          </a:p>
+          <a:p>
+            <a:endParaRPr lang="en-US" b="1" dirty="0" smtClean="0"/>
+          </a:p>
+          <a:p>
+            <a:r>
+              <a:rPr lang="en-US" dirty="0" smtClean="0"/>
+              <a:t>These slides:</a:t>
+            </a:r>
+            <a:endParaRPr lang="en-US" b="1" dirty="0" smtClean="0"/>
+          </a:p>
+          <a:p>
+            <a:pPr>
+              <a:buNone/>
+            </a:pPr>
+            <a:endParaRPr lang="en-US" b="1" dirty="0" smtClean="0"/>
+          </a:p>
+          <a:p>
+            <a:endParaRPr lang="en-US" dirty="0" smtClean="0"/>
+          </a:p>
+          <a:p>
+            <a:pPr>
+              <a:buNone/>
+            </a:pPr>
+            <a:endParaRPr lang="en-US" dirty="0" smtClean="0"/>
+          </a:p>
+        </p:txBody>
+      </p:sp>
+    </p:spTree>
+  </p:cSld>
+  <p:clrMapOvr>
+    <a:masterClrMapping/>
+  </p:clrMapOvr>
+  <p:timing>
+    <p:tnLst>
+      <p:par>
+        <p:cTn id="1" dur="indefinite" restart="never" nodeType="tmRoot"/>
+      </p:par>
+    </p:tnLst>
+  </p:timing>
+</p:sld>
+</file>
+
 <file path=ppt/slides/slide2.xml><?xml version="1.0" encoding="utf-8"?>
 <p:sld xmlns:a="http://schemas.openxmlformats.org/drawingml/2006/main" xmlns:r="http://schemas.openxmlformats.org/officeDocument/2006/relationships" xmlns:p="http://schemas.openxmlformats.org/presentationml/2006/main">
   <p:cSld>
@@ -3877,7 +4073,7 @@
           <a:p>
             <a:r>
               <a:rPr lang="en-US" sz="9000" dirty="0" smtClean="0"/>
-              <a:t>Think long term!</a:t>
+              <a:t>Keep learning</a:t>
             </a:r>
             <a:endParaRPr lang="en-US" sz="9000" dirty="0"/>
           </a:p>
@@ -3910,118 +4106,33 @@
       </p:grpSpPr>
       <p:sp>
         <p:nvSpPr>
-          <p:cNvPr id="2" name="Title 1"/>
-          <p:cNvSpPr>
-            <a:spLocks noGrp="1"/>
-          </p:cNvSpPr>
-          <p:nvPr>
-            <p:ph type="title"/>
-          </p:nvPr>
-        </p:nvSpPr>
-        <p:spPr/>
-        <p:txBody>
-          <a:bodyPr>
-            <a:normAutofit/>
-          </a:bodyPr>
-          <a:lstStyle/>
-          <a:p>
-            <a:r>
-              <a:rPr lang="en-US" dirty="0" smtClean="0"/>
-              <a:t>My Info</a:t>
-            </a:r>
-            <a:endParaRPr lang="en-US" dirty="0"/>
-          </a:p>
-        </p:txBody>
-      </p:sp>
-      <p:sp>
-        <p:nvSpPr>
-          <p:cNvPr id="3" name="Content Placeholder 2"/>
-          <p:cNvSpPr>
-            <a:spLocks noGrp="1"/>
-          </p:cNvSpPr>
-          <p:nvPr>
-            <p:ph idx="1"/>
-          </p:nvPr>
-        </p:nvSpPr>
-        <p:spPr/>
-        <p:txBody>
-          <a:bodyPr>
-            <a:normAutofit/>
-          </a:bodyPr>
-          <a:lstStyle/>
-          <a:p>
-            <a:r>
-              <a:rPr lang="en-US" dirty="0" smtClean="0"/>
-              <a:t>Email: </a:t>
-            </a:r>
-            <a:r>
-              <a:rPr lang="en-US" b="1" dirty="0" smtClean="0">
-                <a:hlinkClick r:id="rId2"/>
-              </a:rPr>
-              <a:t>jon@jonkruger.com</a:t>
-            </a:r>
-            <a:endParaRPr lang="en-US" b="1" dirty="0" smtClean="0"/>
-          </a:p>
-          <a:p>
-            <a:r>
-              <a:rPr lang="en-US" dirty="0" smtClean="0"/>
-              <a:t>Twitter: </a:t>
-            </a:r>
-            <a:r>
-              <a:rPr lang="en-US" b="1" dirty="0" smtClean="0"/>
-              <a:t>@</a:t>
-            </a:r>
-            <a:r>
-              <a:rPr lang="en-US" b="1" dirty="0" err="1" smtClean="0"/>
-              <a:t>JonKruger</a:t>
-            </a:r>
-            <a:endParaRPr lang="en-US" b="1" dirty="0" smtClean="0"/>
-          </a:p>
-          <a:p>
-            <a:r>
-              <a:rPr lang="en-US" dirty="0" smtClean="0"/>
-              <a:t>Blog: </a:t>
-            </a:r>
-            <a:r>
-              <a:rPr lang="en-US" b="1" dirty="0" smtClean="0">
-                <a:hlinkClick r:id="rId3"/>
-              </a:rPr>
-              <a:t>http://jonkruger.com/blog</a:t>
-            </a:r>
-            <a:endParaRPr lang="en-US" b="1" dirty="0" smtClean="0"/>
-          </a:p>
-          <a:p>
-            <a:endParaRPr lang="en-US" b="1" dirty="0" smtClean="0"/>
-          </a:p>
-          <a:p>
-            <a:r>
-              <a:rPr lang="en-US" dirty="0" smtClean="0"/>
-              <a:t>These </a:t>
-            </a:r>
-            <a:r>
-              <a:rPr lang="en-US" dirty="0" smtClean="0"/>
-              <a:t>slides</a:t>
-            </a:r>
-            <a:r>
-              <a:rPr lang="en-US" dirty="0" smtClean="0"/>
-              <a:t>:</a:t>
-            </a:r>
-            <a:endParaRPr lang="en-US" b="1" dirty="0" smtClean="0"/>
-          </a:p>
-          <a:p>
-            <a:pPr>
-              <a:buNone/>
-            </a:pPr>
-            <a:endParaRPr lang="en-US" b="1" dirty="0" smtClean="0"/>
-          </a:p>
-          <a:p>
-            <a:endParaRPr lang="en-US" dirty="0" smtClean="0"/>
-          </a:p>
-          <a:p>
-            <a:pPr>
-              <a:buNone/>
-            </a:pPr>
-            <a:endParaRPr lang="en-US" dirty="0" smtClean="0"/>
+          <p:cNvPr id="4" name="Title 3"/>
+          <p:cNvSpPr>
+            <a:spLocks noGrp="1"/>
+          </p:cNvSpPr>
+          <p:nvPr>
+            <p:ph type="ctrTitle"/>
+          </p:nvPr>
+        </p:nvSpPr>
+        <p:spPr>
+          <a:xfrm>
+            <a:off x="304800" y="228600"/>
+            <a:ext cx="8534400" cy="6400800"/>
+          </a:xfrm>
+        </p:spPr>
+        <p:txBody>
+          <a:bodyPr anchor="ctr"/>
+          <a:lstStyle/>
+          <a:p>
+            <a:r>
+              <a:rPr lang="en-US" sz="9000" dirty="0" smtClean="0"/>
+              <a:t>Have </a:t>
+            </a:r>
+            <a:r>
+              <a:rPr lang="en-US" sz="9000" smtClean="0"/>
+              <a:t>a plan</a:t>
+            </a:r>
+            <a:endParaRPr lang="en-US" sz="9000" dirty="0"/>
           </a:p>
         </p:txBody>
       </p:sp>
@@ -4030,13 +4141,6 @@
   <p:clrMapOvr>
     <a:masterClrMapping/>
   </p:clrMapOvr>
-  <p:timing>
-    <p:tnLst>
-      <p:par>
-        <p:cTn id="1" dur="indefinite" restart="never" nodeType="tmRoot"/>
-      </p:par>
-    </p:tnLst>
-  </p:timing>
 </p:sld>
 </file>
 

</xml_diff>